<commit_message>
moved "check if position valid" to public
</commit_message>
<xml_diff>
--- a/Ants! Game Presentation.pptx
+++ b/Ants! Game Presentation.pptx
@@ -204,7 +204,7 @@
           <a:p>
             <a:fld id="{E8360A9B-8470-4061-9975-498595E30F22}" type="datetimeFigureOut">
               <a:rPr lang="en-US"/>
-              <a:t>7/31/2015</a:t>
+              <a:t>8/1/2015</a:t>
             </a:fld>
             <a:endParaRPr lang="en-US"/>
           </a:p>
@@ -1615,7 +1615,7 @@
           <a:p>
             <a:fld id="{F1FA7AC5-6045-4418-8E60-F48788734473}" type="datetimeFigureOut">
               <a:rPr lang="en-US" smtClean="0"/>
-              <a:t>7/31/2015</a:t>
+              <a:t>8/1/2015</a:t>
             </a:fld>
             <a:endParaRPr lang="en-US"/>
           </a:p>
@@ -1866,7 +1866,7 @@
           <a:p>
             <a:fld id="{F1FA7AC5-6045-4418-8E60-F48788734473}" type="datetimeFigureOut">
               <a:rPr lang="en-US" smtClean="0"/>
-              <a:t>7/31/2015</a:t>
+              <a:t>8/1/2015</a:t>
             </a:fld>
             <a:endParaRPr lang="en-US"/>
           </a:p>
@@ -2180,7 +2180,7 @@
           <a:p>
             <a:fld id="{F1FA7AC5-6045-4418-8E60-F48788734473}" type="datetimeFigureOut">
               <a:rPr lang="en-US" smtClean="0"/>
-              <a:t>7/31/2015</a:t>
+              <a:t>8/1/2015</a:t>
             </a:fld>
             <a:endParaRPr lang="en-US"/>
           </a:p>
@@ -2507,7 +2507,7 @@
           <a:p>
             <a:fld id="{F1FA7AC5-6045-4418-8E60-F48788734473}" type="datetimeFigureOut">
               <a:rPr lang="en-US" smtClean="0"/>
-              <a:t>7/31/2015</a:t>
+              <a:t>8/1/2015</a:t>
             </a:fld>
             <a:endParaRPr lang="en-US"/>
           </a:p>
@@ -2821,7 +2821,7 @@
           <a:p>
             <a:fld id="{F1FA7AC5-6045-4418-8E60-F48788734473}" type="datetimeFigureOut">
               <a:rPr lang="en-US" smtClean="0"/>
-              <a:t>7/31/2015</a:t>
+              <a:t>8/1/2015</a:t>
             </a:fld>
             <a:endParaRPr lang="en-US"/>
           </a:p>
@@ -3208,7 +3208,7 @@
           <a:p>
             <a:fld id="{F1FA7AC5-6045-4418-8E60-F48788734473}" type="datetimeFigureOut">
               <a:rPr lang="en-US" smtClean="0"/>
-              <a:t>7/31/2015</a:t>
+              <a:t>8/1/2015</a:t>
             </a:fld>
             <a:endParaRPr lang="en-US"/>
           </a:p>
@@ -3378,7 +3378,7 @@
           <a:p>
             <a:fld id="{F1FA7AC5-6045-4418-8E60-F48788734473}" type="datetimeFigureOut">
               <a:rPr lang="en-US" smtClean="0"/>
-              <a:t>7/31/2015</a:t>
+              <a:t>8/1/2015</a:t>
             </a:fld>
             <a:endParaRPr lang="en-US"/>
           </a:p>
@@ -3558,7 +3558,7 @@
           <a:p>
             <a:fld id="{F1FA7AC5-6045-4418-8E60-F48788734473}" type="datetimeFigureOut">
               <a:rPr lang="en-US" smtClean="0"/>
-              <a:t>7/31/2015</a:t>
+              <a:t>8/1/2015</a:t>
             </a:fld>
             <a:endParaRPr lang="en-US"/>
           </a:p>
@@ -3734,7 +3734,7 @@
           <a:p>
             <a:fld id="{F1FA7AC5-6045-4418-8E60-F48788734473}" type="datetimeFigureOut">
               <a:rPr lang="en-US" smtClean="0"/>
-              <a:t>7/31/2015</a:t>
+              <a:t>8/1/2015</a:t>
             </a:fld>
             <a:endParaRPr lang="en-US"/>
           </a:p>
@@ -3981,7 +3981,7 @@
           <a:p>
             <a:fld id="{F1FA7AC5-6045-4418-8E60-F48788734473}" type="datetimeFigureOut">
               <a:rPr lang="en-US" smtClean="0"/>
-              <a:t>7/31/2015</a:t>
+              <a:t>8/1/2015</a:t>
             </a:fld>
             <a:endParaRPr lang="en-US"/>
           </a:p>
@@ -4213,7 +4213,7 @@
           <a:p>
             <a:fld id="{F1FA7AC5-6045-4418-8E60-F48788734473}" type="datetimeFigureOut">
               <a:rPr lang="en-US" smtClean="0"/>
-              <a:t>7/31/2015</a:t>
+              <a:t>8/1/2015</a:t>
             </a:fld>
             <a:endParaRPr lang="en-US"/>
           </a:p>
@@ -4587,7 +4587,7 @@
           <a:p>
             <a:fld id="{F1FA7AC5-6045-4418-8E60-F48788734473}" type="datetimeFigureOut">
               <a:rPr lang="en-US" smtClean="0"/>
-              <a:t>7/31/2015</a:t>
+              <a:t>8/1/2015</a:t>
             </a:fld>
             <a:endParaRPr lang="en-US"/>
           </a:p>
@@ -4710,7 +4710,7 @@
           <a:p>
             <a:fld id="{F1FA7AC5-6045-4418-8E60-F48788734473}" type="datetimeFigureOut">
               <a:rPr lang="en-US" smtClean="0"/>
-              <a:t>7/31/2015</a:t>
+              <a:t>8/1/2015</a:t>
             </a:fld>
             <a:endParaRPr lang="en-US"/>
           </a:p>
@@ -4805,7 +4805,7 @@
           <a:p>
             <a:fld id="{F1FA7AC5-6045-4418-8E60-F48788734473}" type="datetimeFigureOut">
               <a:rPr lang="en-US" smtClean="0"/>
-              <a:t>7/31/2015</a:t>
+              <a:t>8/1/2015</a:t>
             </a:fld>
             <a:endParaRPr lang="en-US"/>
           </a:p>
@@ -5060,7 +5060,7 @@
           <a:p>
             <a:fld id="{F1FA7AC5-6045-4418-8E60-F48788734473}" type="datetimeFigureOut">
               <a:rPr lang="en-US" smtClean="0"/>
-              <a:t>7/31/2015</a:t>
+              <a:t>8/1/2015</a:t>
             </a:fld>
             <a:endParaRPr lang="en-US"/>
           </a:p>
@@ -5323,7 +5323,7 @@
           <a:p>
             <a:fld id="{F1FA7AC5-6045-4418-8E60-F48788734473}" type="datetimeFigureOut">
               <a:rPr lang="en-US" smtClean="0"/>
-              <a:t>7/31/2015</a:t>
+              <a:t>8/1/2015</a:t>
             </a:fld>
             <a:endParaRPr lang="en-US"/>
           </a:p>
@@ -6068,7 +6068,7 @@
           <a:p>
             <a:fld id="{F1FA7AC5-6045-4418-8E60-F48788734473}" type="datetimeFigureOut">
               <a:rPr lang="en-US" smtClean="0"/>
-              <a:t>7/31/2015</a:t>
+              <a:t>8/1/2015</a:t>
             </a:fld>
             <a:endParaRPr lang="en-US"/>
           </a:p>
@@ -7230,8 +7230,13 @@
           <a:p>
             <a:r>
               <a:rPr lang="en-US" dirty="0"/>
-              <a:t>Goal: Kill the Queen of either side and you win!</a:t>
-            </a:r>
+              <a:t>Goal: Kill the Queen of either side </a:t>
+            </a:r>
+            <a:r>
+              <a:rPr lang="en-US" dirty="0" smtClean="0"/>
+              <a:t>and you win!</a:t>
+            </a:r>
+            <a:endParaRPr lang="en-US" dirty="0"/>
           </a:p>
           <a:p>
             <a:endParaRPr lang="en-US" dirty="0"/>
@@ -7407,7 +7412,29 @@
                 <a:latin typeface="Times New Roman" panose="02020603050405020304" pitchFamily="18" charset="0"/>
                 <a:cs typeface="Times New Roman" panose="02020603050405020304" pitchFamily="18" charset="0"/>
               </a:rPr>
-              <a:t>crowd simulator</a:t>
+              <a:t>crowd </a:t>
+            </a:r>
+            <a:r>
+              <a:rPr lang="en-US" sz="2000" dirty="0" smtClean="0">
+                <a:solidFill>
+                  <a:schemeClr val="tx1"/>
+                </a:solidFill>
+                <a:latin typeface="Times New Roman" panose="02020603050405020304" pitchFamily="18" charset="0"/>
+                <a:cs typeface="Times New Roman" panose="02020603050405020304" pitchFamily="18" charset="0"/>
+              </a:rPr>
+              <a:t>simulator</a:t>
+            </a:r>
+          </a:p>
+          <a:p>
+            <a:r>
+              <a:rPr lang="en-US" sz="2000" smtClean="0">
+                <a:solidFill>
+                  <a:schemeClr val="tx1"/>
+                </a:solidFill>
+                <a:latin typeface="Times New Roman" panose="02020603050405020304" pitchFamily="18" charset="0"/>
+                <a:cs typeface="Times New Roman" panose="02020603050405020304" pitchFamily="18" charset="0"/>
+              </a:rPr>
+              <a:t>Possible endings</a:t>
             </a:r>
             <a:endParaRPr lang="en-US" sz="2000" dirty="0">
               <a:solidFill>

</xml_diff>